<commit_message>
update presentation about the project
</commit_message>
<xml_diff>
--- a/Presentazione progetto.pptx
+++ b/Presentazione progetto.pptx
@@ -136,6 +136,9 @@
         </p14:section>
       </p14:sectionLst>
     </p:ext>
+    <p:ext uri="{EFAFB233-063F-42B5-8137-9DF3F51BA10A}">
+      <p15:sldGuideLst xmlns:p15="http://schemas.microsoft.com/office/powerpoint/2012/main"/>
+    </p:ext>
   </p:extLst>
 </p:presentation>
 </file>
@@ -234,7 +237,7 @@
           <a:p>
             <a:fld id="{60586234-2229-4118-A8DF-67060F217143}" type="datetimeFigureOut">
               <a:rPr lang="it-IT" smtClean="0"/>
-              <a:t>10/10/2023</a:t>
+              <a:t>18/10/2023</a:t>
             </a:fld>
             <a:endParaRPr lang="it-IT"/>
           </a:p>
@@ -412,7 +415,7 @@
           <a:p>
             <a:fld id="{167F814D-0BB3-4233-801A-0C5708473B14}" type="datetimeFigureOut">
               <a:rPr lang="it-IT" smtClean="0"/>
-              <a:t>10/10/2023</a:t>
+              <a:t>18/10/2023</a:t>
             </a:fld>
             <a:endParaRPr lang="it-IT"/>
           </a:p>
@@ -827,7 +830,7 @@
           <a:p>
             <a:fld id="{1BE3CAA6-8583-46C3-9482-7163E0EBC265}" type="datetime1">
               <a:rPr lang="it-IT" smtClean="0"/>
-              <a:t>10/10/2023</a:t>
+              <a:t>18/10/2023</a:t>
             </a:fld>
             <a:endParaRPr lang="it-IT"/>
           </a:p>
@@ -1028,7 +1031,7 @@
           <a:p>
             <a:fld id="{A872CB48-34BD-4122-A5AB-D29D2AD57276}" type="datetime1">
               <a:rPr lang="it-IT" smtClean="0"/>
-              <a:t>10/10/2023</a:t>
+              <a:t>18/10/2023</a:t>
             </a:fld>
             <a:endParaRPr lang="it-IT"/>
           </a:p>
@@ -1239,7 +1242,7 @@
           <a:p>
             <a:fld id="{F73B7BD4-4E39-4EC0-8B5A-0CF0121E99E1}" type="datetime1">
               <a:rPr lang="it-IT" smtClean="0"/>
-              <a:t>10/10/2023</a:t>
+              <a:t>18/10/2023</a:t>
             </a:fld>
             <a:endParaRPr lang="it-IT"/>
           </a:p>
@@ -1440,7 +1443,7 @@
           <a:p>
             <a:fld id="{D21B15F3-D610-4890-BA19-F91BA0A7343A}" type="datetime1">
               <a:rPr lang="it-IT" smtClean="0"/>
-              <a:t>10/10/2023</a:t>
+              <a:t>18/10/2023</a:t>
             </a:fld>
             <a:endParaRPr lang="it-IT"/>
           </a:p>
@@ -1718,7 +1721,7 @@
           <a:p>
             <a:fld id="{BC88D7C5-EDD0-47CF-B4D5-E493EA3721AA}" type="datetime1">
               <a:rPr lang="it-IT" smtClean="0"/>
-              <a:t>10/10/2023</a:t>
+              <a:t>18/10/2023</a:t>
             </a:fld>
             <a:endParaRPr lang="it-IT"/>
           </a:p>
@@ -1986,7 +1989,7 @@
           <a:p>
             <a:fld id="{2E1C5A54-C924-4448-83B0-A427857AB5EA}" type="datetime1">
               <a:rPr lang="it-IT" smtClean="0"/>
-              <a:t>10/10/2023</a:t>
+              <a:t>18/10/2023</a:t>
             </a:fld>
             <a:endParaRPr lang="it-IT"/>
           </a:p>
@@ -2401,7 +2404,7 @@
           <a:p>
             <a:fld id="{8CD662CD-DC79-4EC8-9032-0ECFFFF0A2D2}" type="datetime1">
               <a:rPr lang="it-IT" smtClean="0"/>
-              <a:t>10/10/2023</a:t>
+              <a:t>18/10/2023</a:t>
             </a:fld>
             <a:endParaRPr lang="it-IT"/>
           </a:p>
@@ -2545,7 +2548,7 @@
           <a:p>
             <a:fld id="{C5E3B2EF-4A03-49D6-A03B-2FE2B6E792C5}" type="datetime1">
               <a:rPr lang="it-IT" smtClean="0"/>
-              <a:t>10/10/2023</a:t>
+              <a:t>18/10/2023</a:t>
             </a:fld>
             <a:endParaRPr lang="it-IT"/>
           </a:p>
@@ -2661,7 +2664,7 @@
           <a:p>
             <a:fld id="{141B1804-09AC-4AA2-B880-491DFD87AB06}" type="datetime1">
               <a:rPr lang="it-IT" smtClean="0"/>
-              <a:t>10/10/2023</a:t>
+              <a:t>18/10/2023</a:t>
             </a:fld>
             <a:endParaRPr lang="it-IT"/>
           </a:p>
@@ -2975,7 +2978,7 @@
           <a:p>
             <a:fld id="{79C4312F-7CDE-49EF-A198-462160ACA2FC}" type="datetime1">
               <a:rPr lang="it-IT" smtClean="0"/>
-              <a:t>10/10/2023</a:t>
+              <a:t>18/10/2023</a:t>
             </a:fld>
             <a:endParaRPr lang="it-IT"/>
           </a:p>
@@ -3266,7 +3269,7 @@
           <a:p>
             <a:fld id="{EE3240D9-C312-4F48-B5F2-45F66E2E656F}" type="datetime1">
               <a:rPr lang="it-IT" smtClean="0"/>
-              <a:t>10/10/2023</a:t>
+              <a:t>18/10/2023</a:t>
             </a:fld>
             <a:endParaRPr lang="it-IT"/>
           </a:p>
@@ -3510,7 +3513,7 @@
           <a:p>
             <a:fld id="{4291C85B-0D87-40AE-ADDD-C3607BF611B9}" type="datetime1">
               <a:rPr lang="it-IT" smtClean="0"/>
-              <a:t>10/10/2023</a:t>
+              <a:t>18/10/2023</a:t>
             </a:fld>
             <a:endParaRPr lang="it-IT"/>
           </a:p>
@@ -4323,7 +4326,7 @@
             </a:r>
             <a:r>
               <a:rPr lang="it-IT" sz="2400" dirty="0"/>
-              <a:t>[writing] -&gt; nodo in cima alla coda, eliminandolo dalla coda</a:t>
+              <a:t>[writing] -&gt; nodo in fondo alla coda, eliminandolo dalla stessa</a:t>
             </a:r>
           </a:p>
           <a:p>

</xml_diff>